<commit_message>
feat(powerpoint): background image in portrait ::by sergio giraldo @ 20231119T1004CET, gpg signed
</commit_message>
<xml_diff>
--- a/powerpoint/ideas14.pptx
+++ b/powerpoint/ideas14.pptx
@@ -110,6 +110,11 @@
       </a:defRPr>
     </a:lvl9pPr>
   </p:defaultTextStyle>
+  <p:extLst>
+    <p:ext uri="{EFAFB233-063F-42B5-8137-9DF3F51BA10A}">
+      <p15:sldGuideLst xmlns:p15="http://schemas.microsoft.com/office/powerpoint/2012/main"/>
+    </p:ext>
+  </p:extLst>
 </p:presentation>
 </file>
 
@@ -547,6 +552,26 @@
               <a:rPr lang="en-NL" dirty="0"/>
               <a:t>The rectangles, light grey background with 28% transparency</a:t>
             </a:r>
+          </a:p>
+          <a:p>
+            <a:r>
+              <a:rPr lang="en-NL" dirty="0"/>
+              <a:t>Make your texts in the rectangles, then group everything.</a:t>
+            </a:r>
+          </a:p>
+          <a:p>
+            <a:r>
+              <a:rPr lang="en-GB" dirty="0"/>
+              <a:t>Duplicate in 4 slides, position each of the parts and </a:t>
+            </a:r>
+            <a:r>
+              <a:rPr lang="en-GB"/>
+              <a:t>morph transition</a:t>
+            </a:r>
+            <a:endParaRPr lang="en-NL"/>
+          </a:p>
+          <a:p>
+            <a:endParaRPr lang="en-NL" dirty="0"/>
           </a:p>
         </p:txBody>
       </p:sp>
@@ -7328,13 +7353,13 @@
   <p:clrMapOvr>
     <a:masterClrMapping/>
   </p:clrMapOvr>
-  <mc:AlternateContent xmlns:mc="http://schemas.openxmlformats.org/markup-compatibility/2006">
-    <mc:Choice xmlns:p159="http://schemas.microsoft.com/office/powerpoint/2015/09/main" Requires="p159">
+  <mc:AlternateContent xmlns:mc="http://schemas.openxmlformats.org/markup-compatibility/2006" xmlns:p159="http://schemas.microsoft.com/office/powerpoint/2015/09/main">
+    <mc:Choice Requires="p159">
       <p:transition xmlns:p14="http://schemas.microsoft.com/office/powerpoint/2010/main" spd="slow" p14:dur="2000">
         <p159:morph option="byObject"/>
       </p:transition>
     </mc:Choice>
-    <mc:Fallback>
+    <mc:Fallback xmlns="">
       <p:transition spd="slow">
         <p:fade/>
       </p:transition>
@@ -10498,13 +10523,13 @@
   <p:clrMapOvr>
     <a:masterClrMapping/>
   </p:clrMapOvr>
-  <mc:AlternateContent xmlns:mc="http://schemas.openxmlformats.org/markup-compatibility/2006">
-    <mc:Choice xmlns:p159="http://schemas.microsoft.com/office/powerpoint/2015/09/main" Requires="p159">
+  <mc:AlternateContent xmlns:mc="http://schemas.openxmlformats.org/markup-compatibility/2006" xmlns:p159="http://schemas.microsoft.com/office/powerpoint/2015/09/main">
+    <mc:Choice Requires="p159">
       <p:transition xmlns:p14="http://schemas.microsoft.com/office/powerpoint/2010/main" spd="slow" p14:dur="2000">
         <p159:morph option="byObject"/>
       </p:transition>
     </mc:Choice>
-    <mc:Fallback>
+    <mc:Fallback xmlns="">
       <p:transition spd="slow">
         <p:fade/>
       </p:transition>
@@ -13668,13 +13693,13 @@
   <p:clrMapOvr>
     <a:masterClrMapping/>
   </p:clrMapOvr>
-  <mc:AlternateContent xmlns:mc="http://schemas.openxmlformats.org/markup-compatibility/2006">
-    <mc:Choice xmlns:p159="http://schemas.microsoft.com/office/powerpoint/2015/09/main" Requires="p159">
+  <mc:AlternateContent xmlns:mc="http://schemas.openxmlformats.org/markup-compatibility/2006" xmlns:p159="http://schemas.microsoft.com/office/powerpoint/2015/09/main">
+    <mc:Choice Requires="p159">
       <p:transition xmlns:p14="http://schemas.microsoft.com/office/powerpoint/2010/main" spd="slow" p14:dur="2000">
         <p159:morph option="byObject"/>
       </p:transition>
     </mc:Choice>
-    <mc:Fallback>
+    <mc:Fallback xmlns="">
       <p:transition spd="slow">
         <p:fade/>
       </p:transition>
@@ -16838,13 +16863,13 @@
   <p:clrMapOvr>
     <a:masterClrMapping/>
   </p:clrMapOvr>
-  <mc:AlternateContent xmlns:mc="http://schemas.openxmlformats.org/markup-compatibility/2006">
-    <mc:Choice xmlns:p159="http://schemas.microsoft.com/office/powerpoint/2015/09/main" Requires="p159">
+  <mc:AlternateContent xmlns:mc="http://schemas.openxmlformats.org/markup-compatibility/2006" xmlns:p159="http://schemas.microsoft.com/office/powerpoint/2015/09/main">
+    <mc:Choice Requires="p159">
       <p:transition xmlns:p14="http://schemas.microsoft.com/office/powerpoint/2010/main" spd="slow" p14:dur="2000">
         <p159:morph option="byObject"/>
       </p:transition>
     </mc:Choice>
-    <mc:Fallback>
+    <mc:Fallback xmlns="">
       <p:transition spd="slow">
         <p:fade/>
       </p:transition>

</xml_diff>

<commit_message>
feat(powerpoint): images in portrait ::by sergio giraldo @ 20231119T1400CET, gpg signed
</commit_message>
<xml_diff>
--- a/powerpoint/ideas14.pptx
+++ b/powerpoint/ideas14.pptx
@@ -5,13 +5,14 @@
     <p:sldMasterId id="2147483648" r:id="rId1"/>
   </p:sldMasterIdLst>
   <p:notesMasterIdLst>
-    <p:notesMasterId r:id="rId6"/>
+    <p:notesMasterId r:id="rId7"/>
   </p:notesMasterIdLst>
   <p:sldIdLst>
-    <p:sldId id="256" r:id="rId2"/>
-    <p:sldId id="257" r:id="rId3"/>
-    <p:sldId id="258" r:id="rId4"/>
-    <p:sldId id="259" r:id="rId5"/>
+    <p:sldId id="260" r:id="rId2"/>
+    <p:sldId id="256" r:id="rId3"/>
+    <p:sldId id="257" r:id="rId4"/>
+    <p:sldId id="258" r:id="rId5"/>
+    <p:sldId id="259" r:id="rId6"/>
   </p:sldIdLst>
   <p:sldSz cx="12192000" cy="6858000"/>
   <p:notesSz cx="6858000" cy="9144000"/>
@@ -592,7 +593,7 @@
           <a:p>
             <a:fld id="{99309753-3C1A-6D47-9142-7C039D978214}" type="slidenum">
               <a:rPr lang="en-NL" smtClean="0"/>
-              <a:t>1</a:t>
+              <a:t>2</a:t>
             </a:fld>
             <a:endParaRPr lang="en-NL"/>
           </a:p>
@@ -715,7 +716,7 @@
           <a:p>
             <a:fld id="{99309753-3C1A-6D47-9142-7C039D978214}" type="slidenum">
               <a:rPr lang="en-NL" smtClean="0"/>
-              <a:t>2</a:t>
+              <a:t>3</a:t>
             </a:fld>
             <a:endParaRPr lang="en-NL"/>
           </a:p>
@@ -838,7 +839,7 @@
           <a:p>
             <a:fld id="{99309753-3C1A-6D47-9142-7C039D978214}" type="slidenum">
               <a:rPr lang="en-NL" smtClean="0"/>
-              <a:t>3</a:t>
+              <a:t>4</a:t>
             </a:fld>
             <a:endParaRPr lang="en-NL"/>
           </a:p>
@@ -961,7 +962,7 @@
           <a:p>
             <a:fld id="{99309753-3C1A-6D47-9142-7C039D978214}" type="slidenum">
               <a:rPr lang="en-NL" smtClean="0"/>
-              <a:t>4</a:t>
+              <a:t>5</a:t>
             </a:fld>
             <a:endParaRPr lang="en-NL"/>
           </a:p>
@@ -4201,6 +4202,313 @@
 <file path=ppt/slides/slide1.xml><?xml version="1.0" encoding="utf-8"?>
 <p:sld xmlns:a="http://schemas.openxmlformats.org/drawingml/2006/main" xmlns:r="http://schemas.openxmlformats.org/officeDocument/2006/relationships" xmlns:p="http://schemas.openxmlformats.org/presentationml/2006/main">
   <p:cSld>
+    <p:bg>
+      <p:bgPr>
+        <a:solidFill>
+          <a:schemeClr val="bg1"/>
+        </a:solidFill>
+        <a:effectLst/>
+      </p:bgPr>
+    </p:bg>
+    <p:spTree>
+      <p:nvGrpSpPr>
+        <p:cNvPr id="1" name=""/>
+        <p:cNvGrpSpPr/>
+        <p:nvPr/>
+      </p:nvGrpSpPr>
+      <p:grpSpPr>
+        <a:xfrm>
+          <a:off x="0" y="0"/>
+          <a:ext cx="0" cy="0"/>
+          <a:chOff x="0" y="0"/>
+          <a:chExt cx="0" cy="0"/>
+        </a:xfrm>
+      </p:grpSpPr>
+      <p:sp>
+        <p:nvSpPr>
+          <p:cNvPr id="7" name="Rectangle 6">
+            <a:extLst>
+              <a:ext uri="{FF2B5EF4-FFF2-40B4-BE49-F238E27FC236}">
+                <a16:creationId xmlns:a16="http://schemas.microsoft.com/office/drawing/2014/main" id="{01D0AF59-99C3-4251-AB9A-C966C6AD4400}"/>
+              </a:ext>
+              <a:ext uri="{C183D7F6-B498-43B3-948B-1728B52AA6E4}">
+                <adec:decorative xmlns:adec="http://schemas.microsoft.com/office/drawing/2017/decorative" val="1"/>
+              </a:ext>
+            </a:extLst>
+          </p:cNvPr>
+          <p:cNvSpPr>
+            <a:spLocks noGrp="1" noRot="1" noChangeAspect="1" noMove="1" noResize="1" noEditPoints="1" noAdjustHandles="1" noChangeArrowheads="1" noChangeShapeType="1" noTextEdit="1"/>
+          </p:cNvSpPr>
+          <p:nvPr>
+            <p:extLst>
+              <p:ext uri="{386F3935-93C4-4BCD-93E2-E3B085C9AB24}">
+                <p16:designElem xmlns:p16="http://schemas.microsoft.com/office/powerpoint/2015/main" val="1"/>
+              </p:ext>
+            </p:extLst>
+          </p:nvPr>
+        </p:nvSpPr>
+        <p:spPr>
+          <a:xfrm>
+            <a:off x="0" y="0"/>
+            <a:ext cx="12192000" cy="6858000"/>
+          </a:xfrm>
+          <a:prstGeom prst="rect">
+            <a:avLst/>
+          </a:prstGeom>
+          <a:solidFill>
+            <a:schemeClr val="bg2"/>
+          </a:solidFill>
+          <a:ln>
+            <a:noFill/>
+          </a:ln>
+        </p:spPr>
+        <p:style>
+          <a:lnRef idx="2">
+            <a:schemeClr val="accent1">
+              <a:shade val="50000"/>
+            </a:schemeClr>
+          </a:lnRef>
+          <a:fillRef idx="1">
+            <a:schemeClr val="accent1"/>
+          </a:fillRef>
+          <a:effectRef idx="0">
+            <a:schemeClr val="accent1"/>
+          </a:effectRef>
+          <a:fontRef idx="minor">
+            <a:schemeClr val="lt1"/>
+          </a:fontRef>
+        </p:style>
+        <p:txBody>
+          <a:bodyPr rtlCol="0" anchor="ctr"/>
+          <a:lstStyle/>
+          <a:p>
+            <a:pPr algn="ctr"/>
+            <a:endParaRPr lang="en-US"/>
+          </a:p>
+        </p:txBody>
+      </p:sp>
+      <p:sp>
+        <p:nvSpPr>
+          <p:cNvPr id="9" name="Rectangle 8">
+            <a:extLst>
+              <a:ext uri="{FF2B5EF4-FFF2-40B4-BE49-F238E27FC236}">
+                <a16:creationId xmlns:a16="http://schemas.microsoft.com/office/drawing/2014/main" id="{1855405F-37A2-4869-9154-F8BE3BECE6C3}"/>
+              </a:ext>
+              <a:ext uri="{C183D7F6-B498-43B3-948B-1728B52AA6E4}">
+                <adec:decorative xmlns:adec="http://schemas.microsoft.com/office/drawing/2017/decorative" val="1"/>
+              </a:ext>
+            </a:extLst>
+          </p:cNvPr>
+          <p:cNvSpPr>
+            <a:spLocks noGrp="1" noRot="1" noChangeAspect="1" noMove="1" noResize="1" noEditPoints="1" noAdjustHandles="1" noChangeArrowheads="1" noChangeShapeType="1" noTextEdit="1"/>
+          </p:cNvSpPr>
+          <p:nvPr>
+            <p:extLst>
+              <p:ext uri="{386F3935-93C4-4BCD-93E2-E3B085C9AB24}">
+                <p16:designElem xmlns:p16="http://schemas.microsoft.com/office/powerpoint/2015/main" val="1"/>
+              </p:ext>
+            </p:extLst>
+          </p:nvPr>
+        </p:nvSpPr>
+        <p:spPr>
+          <a:xfrm>
+            <a:off x="477012" y="480060"/>
+            <a:ext cx="11237976" cy="5897880"/>
+          </a:xfrm>
+          <a:prstGeom prst="rect">
+            <a:avLst/>
+          </a:prstGeom>
+          <a:solidFill>
+            <a:srgbClr val="FFFFFF"/>
+          </a:solidFill>
+          <a:ln w="9525">
+            <a:noFill/>
+          </a:ln>
+          <a:effectLst>
+            <a:outerShdw blurRad="63500" dist="17780" dir="5400000" algn="t" rotWithShape="0">
+              <a:prstClr val="black">
+                <a:alpha val="43000"/>
+              </a:prstClr>
+            </a:outerShdw>
+          </a:effectLst>
+        </p:spPr>
+        <p:style>
+          <a:lnRef idx="2">
+            <a:schemeClr val="accent1">
+              <a:shade val="50000"/>
+            </a:schemeClr>
+          </a:lnRef>
+          <a:fillRef idx="1">
+            <a:schemeClr val="accent1"/>
+          </a:fillRef>
+          <a:effectRef idx="0">
+            <a:schemeClr val="accent1"/>
+          </a:effectRef>
+          <a:fontRef idx="minor">
+            <a:schemeClr val="lt1"/>
+          </a:fontRef>
+        </p:style>
+        <p:txBody>
+          <a:bodyPr rtlCol="0" anchor="ctr"/>
+          <a:lstStyle/>
+          <a:p>
+            <a:pPr algn="ctr"/>
+            <a:endParaRPr lang="en-US"/>
+          </a:p>
+        </p:txBody>
+      </p:sp>
+      <p:pic>
+        <p:nvPicPr>
+          <p:cNvPr id="2" name="Picture 1" descr="A group of women walking in front of a tall tower&#10;&#10;Description automatically generated">
+            <a:extLst>
+              <a:ext uri="{FF2B5EF4-FFF2-40B4-BE49-F238E27FC236}">
+                <a16:creationId xmlns:a16="http://schemas.microsoft.com/office/drawing/2014/main" id="{856815B8-624B-BBFF-ED76-54E39777CB8A}"/>
+              </a:ext>
+            </a:extLst>
+          </p:cNvPr>
+          <p:cNvPicPr>
+            <a:picLocks noChangeAspect="1"/>
+          </p:cNvPicPr>
+          <p:nvPr/>
+        </p:nvPicPr>
+        <p:blipFill>
+          <a:blip r:embed="rId2"/>
+          <a:stretch>
+            <a:fillRect/>
+          </a:stretch>
+        </p:blipFill>
+        <p:spPr>
+          <a:xfrm>
+            <a:off x="591849" y="643467"/>
+            <a:ext cx="4178299" cy="5571066"/>
+          </a:xfrm>
+          <a:prstGeom prst="rect">
+            <a:avLst/>
+          </a:prstGeom>
+        </p:spPr>
+      </p:pic>
+      <p:sp>
+        <p:nvSpPr>
+          <p:cNvPr id="3" name="TextBox 2">
+            <a:extLst>
+              <a:ext uri="{FF2B5EF4-FFF2-40B4-BE49-F238E27FC236}">
+                <a16:creationId xmlns:a16="http://schemas.microsoft.com/office/drawing/2014/main" id="{E0DBF833-2A4B-3CB7-2942-6F6C5257B20E}"/>
+              </a:ext>
+            </a:extLst>
+          </p:cNvPr>
+          <p:cNvSpPr txBox="1"/>
+          <p:nvPr/>
+        </p:nvSpPr>
+        <p:spPr>
+          <a:xfrm>
+            <a:off x="4990716" y="643467"/>
+            <a:ext cx="6462025" cy="1938992"/>
+          </a:xfrm>
+          <a:prstGeom prst="rect">
+            <a:avLst/>
+          </a:prstGeom>
+          <a:noFill/>
+        </p:spPr>
+        <p:txBody>
+          <a:bodyPr wrap="none" rtlCol="0">
+            <a:spAutoFit/>
+          </a:bodyPr>
+          <a:lstStyle/>
+          <a:p>
+            <a:pPr algn="ctr"/>
+            <a:r>
+              <a:rPr lang="en-NL" sz="6000" b="1" dirty="0">
+                <a:latin typeface="Eras Medium ITC" panose="020F0502020204030204" pitchFamily="34" charset="0"/>
+                <a:cs typeface="Eras Medium ITC" panose="020F0502020204030204" pitchFamily="34" charset="0"/>
+              </a:rPr>
+              <a:t>THE TOWER AND</a:t>
+            </a:r>
+          </a:p>
+          <a:p>
+            <a:pPr algn="ctr"/>
+            <a:r>
+              <a:rPr lang="en-NL" sz="6000" b="1" dirty="0">
+                <a:latin typeface="Eras Medium ITC" panose="020F0502020204030204" pitchFamily="34" charset="0"/>
+                <a:cs typeface="Eras Medium ITC" panose="020F0502020204030204" pitchFamily="34" charset="0"/>
+              </a:rPr>
+              <a:t>THE LADIES</a:t>
+            </a:r>
+          </a:p>
+        </p:txBody>
+      </p:sp>
+      <p:sp>
+        <p:nvSpPr>
+          <p:cNvPr id="4" name="TextBox 3">
+            <a:extLst>
+              <a:ext uri="{FF2B5EF4-FFF2-40B4-BE49-F238E27FC236}">
+                <a16:creationId xmlns:a16="http://schemas.microsoft.com/office/drawing/2014/main" id="{097A31D8-9992-EB39-9249-23111E00E838}"/>
+              </a:ext>
+            </a:extLst>
+          </p:cNvPr>
+          <p:cNvSpPr txBox="1"/>
+          <p:nvPr/>
+        </p:nvSpPr>
+        <p:spPr>
+          <a:xfrm>
+            <a:off x="8672808" y="5506647"/>
+            <a:ext cx="2800447" cy="707886"/>
+          </a:xfrm>
+          <a:prstGeom prst="rect">
+            <a:avLst/>
+          </a:prstGeom>
+          <a:noFill/>
+        </p:spPr>
+        <p:txBody>
+          <a:bodyPr wrap="none" rtlCol="0">
+            <a:spAutoFit/>
+          </a:bodyPr>
+          <a:lstStyle/>
+          <a:p>
+            <a:r>
+              <a:rPr lang="en-NL" sz="2000" b="1" dirty="0">
+                <a:cs typeface="Eras Medium ITC" panose="020F0502020204030204" pitchFamily="34" charset="0"/>
+              </a:rPr>
+              <a:t>Sergio Rodrigues Giraldo</a:t>
+            </a:r>
+          </a:p>
+          <a:p>
+            <a:r>
+              <a:rPr lang="en-NL" sz="2000" b="1" dirty="0">
+                <a:cs typeface="Eras Medium ITC" panose="020F0502020204030204" pitchFamily="34" charset="0"/>
+              </a:rPr>
+              <a:t>Netherlands – Nov 2023</a:t>
+            </a:r>
+          </a:p>
+        </p:txBody>
+      </p:sp>
+    </p:spTree>
+    <p:extLst>
+      <p:ext uri="{BB962C8B-B14F-4D97-AF65-F5344CB8AC3E}">
+        <p14:creationId xmlns:p14="http://schemas.microsoft.com/office/powerpoint/2010/main" val="327498194"/>
+      </p:ext>
+    </p:extLst>
+  </p:cSld>
+  <p:clrMapOvr>
+    <a:masterClrMapping/>
+  </p:clrMapOvr>
+  <mc:AlternateContent xmlns:mc="http://schemas.openxmlformats.org/markup-compatibility/2006">
+    <mc:Choice xmlns:p14="http://schemas.microsoft.com/office/powerpoint/2010/main" Requires="p14">
+      <p:transition spd="slow" p14:dur="3400">
+        <p14:reveal/>
+      </p:transition>
+    </mc:Choice>
+    <mc:Fallback>
+      <p:transition spd="slow">
+        <p:fade/>
+      </p:transition>
+    </mc:Fallback>
+  </mc:AlternateContent>
+</p:sld>
+</file>
+
+<file path=ppt/slides/slide2.xml><?xml version="1.0" encoding="utf-8"?>
+<p:sld xmlns:a="http://schemas.openxmlformats.org/drawingml/2006/main" xmlns:r="http://schemas.openxmlformats.org/officeDocument/2006/relationships" xmlns:p="http://schemas.openxmlformats.org/presentationml/2006/main">
+  <p:cSld>
     <p:spTree>
       <p:nvGrpSpPr>
         <p:cNvPr id="1" name=""/>
@@ -7353,22 +7661,22 @@
   <p:clrMapOvr>
     <a:masterClrMapping/>
   </p:clrMapOvr>
-  <mc:AlternateContent xmlns:mc="http://schemas.openxmlformats.org/markup-compatibility/2006" xmlns:p159="http://schemas.microsoft.com/office/powerpoint/2015/09/main">
-    <mc:Choice Requires="p159">
-      <p:transition xmlns:p14="http://schemas.microsoft.com/office/powerpoint/2010/main" spd="slow" p14:dur="2000">
-        <p159:morph option="byObject"/>
+  <mc:AlternateContent xmlns:mc="http://schemas.openxmlformats.org/markup-compatibility/2006">
+    <mc:Choice xmlns:p14="http://schemas.microsoft.com/office/powerpoint/2010/main" Requires="p14">
+      <p:transition spd="slow" p14:dur="2000">
+        <p:wipe/>
       </p:transition>
     </mc:Choice>
-    <mc:Fallback xmlns="">
+    <mc:Fallback>
       <p:transition spd="slow">
-        <p:fade/>
+        <p:wipe/>
       </p:transition>
     </mc:Fallback>
   </mc:AlternateContent>
 </p:sld>
 </file>
 
-<file path=ppt/slides/slide2.xml><?xml version="1.0" encoding="utf-8"?>
+<file path=ppt/slides/slide3.xml><?xml version="1.0" encoding="utf-8"?>
 <p:sld xmlns:a="http://schemas.openxmlformats.org/drawingml/2006/main" xmlns:r="http://schemas.openxmlformats.org/officeDocument/2006/relationships" xmlns:p="http://schemas.openxmlformats.org/presentationml/2006/main">
   <p:cSld>
     <p:spTree>
@@ -10538,7 +10846,7 @@
 </p:sld>
 </file>
 
-<file path=ppt/slides/slide3.xml><?xml version="1.0" encoding="utf-8"?>
+<file path=ppt/slides/slide4.xml><?xml version="1.0" encoding="utf-8"?>
 <p:sld xmlns:a="http://schemas.openxmlformats.org/drawingml/2006/main" xmlns:r="http://schemas.openxmlformats.org/officeDocument/2006/relationships" xmlns:p="http://schemas.openxmlformats.org/presentationml/2006/main">
   <p:cSld>
     <p:spTree>
@@ -13708,7 +14016,7 @@
 </p:sld>
 </file>
 
-<file path=ppt/slides/slide4.xml><?xml version="1.0" encoding="utf-8"?>
+<file path=ppt/slides/slide5.xml><?xml version="1.0" encoding="utf-8"?>
 <p:sld xmlns:a="http://schemas.openxmlformats.org/drawingml/2006/main" xmlns:r="http://schemas.openxmlformats.org/officeDocument/2006/relationships" xmlns:p="http://schemas.openxmlformats.org/presentationml/2006/main">
   <p:cSld>
     <p:spTree>
@@ -16198,6 +16506,9 @@
               <a:pPr algn="ctr"/>
               <a:r>
                 <a:rPr lang="en-NL" sz="4000" b="1" dirty="0">
+                  <a:solidFill>
+                    <a:schemeClr val="tx1"/>
+                  </a:solidFill>
                   <a:latin typeface="Eras Medium ITC" panose="020F0502020204030204" pitchFamily="34" charset="0"/>
                   <a:cs typeface="Eras Medium ITC" panose="020F0502020204030204" pitchFamily="34" charset="0"/>
                 </a:rPr>

</xml_diff>